<commit_message>
file update for inplace = True
</commit_message>
<xml_diff>
--- a/Presentation.pptx
+++ b/Presentation.pptx
@@ -7,6 +7,12 @@
   <p:sldIdLst>
     <p:sldId id="256" r:id="rId2"/>
     <p:sldId id="257" r:id="rId3"/>
+    <p:sldId id="258" r:id="rId4"/>
+    <p:sldId id="259" r:id="rId5"/>
+    <p:sldId id="261" r:id="rId6"/>
+    <p:sldId id="263" r:id="rId7"/>
+    <p:sldId id="260" r:id="rId8"/>
+    <p:sldId id="262" r:id="rId9"/>
   </p:sldIdLst>
   <p:sldSz cx="12192000" cy="6858000"/>
   <p:notesSz cx="6858000" cy="9144000"/>
@@ -105,6 +111,11 @@
       </a:defRPr>
     </a:lvl9pPr>
   </p:defaultTextStyle>
+  <p:extLst>
+    <p:ext uri="{EFAFB233-063F-42B5-8137-9DF3F51BA10A}">
+      <p15:sldGuideLst xmlns:p15="http://schemas.microsoft.com/office/powerpoint/2012/main"/>
+    </p:ext>
+  </p:extLst>
 </p:presentation>
 </file>
 
@@ -257,7 +268,7 @@
           <a:p>
             <a:fld id="{6B46C4F9-6B08-4571-A5E9-D49E73FBD53B}" type="datetimeFigureOut">
               <a:rPr lang="en-SG" smtClean="0"/>
-              <a:t>20/11/2019</a:t>
+              <a:t>22/11/2019</a:t>
             </a:fld>
             <a:endParaRPr lang="en-SG"/>
           </a:p>
@@ -457,7 +468,7 @@
           <a:p>
             <a:fld id="{6B46C4F9-6B08-4571-A5E9-D49E73FBD53B}" type="datetimeFigureOut">
               <a:rPr lang="en-SG" smtClean="0"/>
-              <a:t>20/11/2019</a:t>
+              <a:t>22/11/2019</a:t>
             </a:fld>
             <a:endParaRPr lang="en-SG"/>
           </a:p>
@@ -667,7 +678,7 @@
           <a:p>
             <a:fld id="{6B46C4F9-6B08-4571-A5E9-D49E73FBD53B}" type="datetimeFigureOut">
               <a:rPr lang="en-SG" smtClean="0"/>
-              <a:t>20/11/2019</a:t>
+              <a:t>22/11/2019</a:t>
             </a:fld>
             <a:endParaRPr lang="en-SG"/>
           </a:p>
@@ -867,7 +878,7 @@
           <a:p>
             <a:fld id="{6B46C4F9-6B08-4571-A5E9-D49E73FBD53B}" type="datetimeFigureOut">
               <a:rPr lang="en-SG" smtClean="0"/>
-              <a:t>20/11/2019</a:t>
+              <a:t>22/11/2019</a:t>
             </a:fld>
             <a:endParaRPr lang="en-SG"/>
           </a:p>
@@ -1143,7 +1154,7 @@
           <a:p>
             <a:fld id="{6B46C4F9-6B08-4571-A5E9-D49E73FBD53B}" type="datetimeFigureOut">
               <a:rPr lang="en-SG" smtClean="0"/>
-              <a:t>20/11/2019</a:t>
+              <a:t>22/11/2019</a:t>
             </a:fld>
             <a:endParaRPr lang="en-SG"/>
           </a:p>
@@ -1411,7 +1422,7 @@
           <a:p>
             <a:fld id="{6B46C4F9-6B08-4571-A5E9-D49E73FBD53B}" type="datetimeFigureOut">
               <a:rPr lang="en-SG" smtClean="0"/>
-              <a:t>20/11/2019</a:t>
+              <a:t>22/11/2019</a:t>
             </a:fld>
             <a:endParaRPr lang="en-SG"/>
           </a:p>
@@ -1826,7 +1837,7 @@
           <a:p>
             <a:fld id="{6B46C4F9-6B08-4571-A5E9-D49E73FBD53B}" type="datetimeFigureOut">
               <a:rPr lang="en-SG" smtClean="0"/>
-              <a:t>20/11/2019</a:t>
+              <a:t>22/11/2019</a:t>
             </a:fld>
             <a:endParaRPr lang="en-SG"/>
           </a:p>
@@ -1968,7 +1979,7 @@
           <a:p>
             <a:fld id="{6B46C4F9-6B08-4571-A5E9-D49E73FBD53B}" type="datetimeFigureOut">
               <a:rPr lang="en-SG" smtClean="0"/>
-              <a:t>20/11/2019</a:t>
+              <a:t>22/11/2019</a:t>
             </a:fld>
             <a:endParaRPr lang="en-SG"/>
           </a:p>
@@ -2081,7 +2092,7 @@
           <a:p>
             <a:fld id="{6B46C4F9-6B08-4571-A5E9-D49E73FBD53B}" type="datetimeFigureOut">
               <a:rPr lang="en-SG" smtClean="0"/>
-              <a:t>20/11/2019</a:t>
+              <a:t>22/11/2019</a:t>
             </a:fld>
             <a:endParaRPr lang="en-SG"/>
           </a:p>
@@ -2394,7 +2405,7 @@
           <a:p>
             <a:fld id="{6B46C4F9-6B08-4571-A5E9-D49E73FBD53B}" type="datetimeFigureOut">
               <a:rPr lang="en-SG" smtClean="0"/>
-              <a:t>20/11/2019</a:t>
+              <a:t>22/11/2019</a:t>
             </a:fld>
             <a:endParaRPr lang="en-SG"/>
           </a:p>
@@ -2683,7 +2694,7 @@
           <a:p>
             <a:fld id="{6B46C4F9-6B08-4571-A5E9-D49E73FBD53B}" type="datetimeFigureOut">
               <a:rPr lang="en-SG" smtClean="0"/>
-              <a:t>20/11/2019</a:t>
+              <a:t>22/11/2019</a:t>
             </a:fld>
             <a:endParaRPr lang="en-SG"/>
           </a:p>
@@ -2926,7 +2937,7 @@
           <a:p>
             <a:fld id="{6B46C4F9-6B08-4571-A5E9-D49E73FBD53B}" type="datetimeFigureOut">
               <a:rPr lang="en-SG" smtClean="0"/>
-              <a:t>20/11/2019</a:t>
+              <a:t>22/11/2019</a:t>
             </a:fld>
             <a:endParaRPr lang="en-SG"/>
           </a:p>
@@ -3810,6 +3821,823 @@
 </p:sld>
 </file>
 
+<file path=ppt/slides/slide3.xml><?xml version="1.0" encoding="utf-8"?>
+<p:sld xmlns:a="http://schemas.openxmlformats.org/drawingml/2006/main" xmlns:r="http://schemas.openxmlformats.org/officeDocument/2006/relationships" xmlns:p="http://schemas.openxmlformats.org/presentationml/2006/main">
+  <p:cSld>
+    <p:spTree>
+      <p:nvGrpSpPr>
+        <p:cNvPr id="1" name=""/>
+        <p:cNvGrpSpPr/>
+        <p:nvPr/>
+      </p:nvGrpSpPr>
+      <p:grpSpPr>
+        <a:xfrm>
+          <a:off x="0" y="0"/>
+          <a:ext cx="0" cy="0"/>
+          <a:chOff x="0" y="0"/>
+          <a:chExt cx="0" cy="0"/>
+        </a:xfrm>
+      </p:grpSpPr>
+      <p:pic>
+        <p:nvPicPr>
+          <p:cNvPr id="2" name="Picture 1">
+            <a:extLst>
+              <a:ext uri="{FF2B5EF4-FFF2-40B4-BE49-F238E27FC236}">
+                <a16:creationId xmlns:a16="http://schemas.microsoft.com/office/drawing/2014/main" id="{8AF3B08F-DF8E-497A-B8BA-FD0A4A99304C}"/>
+              </a:ext>
+            </a:extLst>
+          </p:cNvPr>
+          <p:cNvPicPr>
+            <a:picLocks noChangeAspect="1"/>
+          </p:cNvPicPr>
+          <p:nvPr/>
+        </p:nvPicPr>
+        <p:blipFill>
+          <a:blip r:embed="rId2"/>
+          <a:stretch>
+            <a:fillRect/>
+          </a:stretch>
+        </p:blipFill>
+        <p:spPr>
+          <a:xfrm>
+            <a:off x="1784232" y="1208101"/>
+            <a:ext cx="6934200" cy="3409950"/>
+          </a:xfrm>
+          <a:prstGeom prst="rect">
+            <a:avLst/>
+          </a:prstGeom>
+        </p:spPr>
+      </p:pic>
+      <p:sp>
+        <p:nvSpPr>
+          <p:cNvPr id="3" name="Rectangle: Rounded Corners 2">
+            <a:extLst>
+              <a:ext uri="{FF2B5EF4-FFF2-40B4-BE49-F238E27FC236}">
+                <a16:creationId xmlns:a16="http://schemas.microsoft.com/office/drawing/2014/main" id="{5597AE04-0E95-4E77-89DB-FAA2B038FB0B}"/>
+              </a:ext>
+            </a:extLst>
+          </p:cNvPr>
+          <p:cNvSpPr/>
+          <p:nvPr/>
+        </p:nvSpPr>
+        <p:spPr>
+          <a:xfrm>
+            <a:off x="1820409" y="2465663"/>
+            <a:ext cx="6861846" cy="295013"/>
+          </a:xfrm>
+          <a:prstGeom prst="roundRect">
+            <a:avLst/>
+          </a:prstGeom>
+          <a:noFill/>
+          <a:ln w="57150">
+            <a:solidFill>
+              <a:schemeClr val="accent6"/>
+            </a:solidFill>
+          </a:ln>
+        </p:spPr>
+        <p:style>
+          <a:lnRef idx="2">
+            <a:schemeClr val="accent1">
+              <a:shade val="50000"/>
+            </a:schemeClr>
+          </a:lnRef>
+          <a:fillRef idx="1">
+            <a:schemeClr val="accent1"/>
+          </a:fillRef>
+          <a:effectRef idx="0">
+            <a:schemeClr val="accent1"/>
+          </a:effectRef>
+          <a:fontRef idx="minor">
+            <a:schemeClr val="lt1"/>
+          </a:fontRef>
+        </p:style>
+        <p:txBody>
+          <a:bodyPr rtlCol="0" anchor="ctr"/>
+          <a:lstStyle/>
+          <a:p>
+            <a:pPr algn="ctr"/>
+            <a:endParaRPr lang="en-SG"/>
+          </a:p>
+        </p:txBody>
+      </p:sp>
+      <p:sp>
+        <p:nvSpPr>
+          <p:cNvPr id="4" name="Rectangle: Rounded Corners 3">
+            <a:extLst>
+              <a:ext uri="{FF2B5EF4-FFF2-40B4-BE49-F238E27FC236}">
+                <a16:creationId xmlns:a16="http://schemas.microsoft.com/office/drawing/2014/main" id="{6D99742F-495F-4B73-A87F-D522B4E4260B}"/>
+              </a:ext>
+            </a:extLst>
+          </p:cNvPr>
+          <p:cNvSpPr/>
+          <p:nvPr/>
+        </p:nvSpPr>
+        <p:spPr>
+          <a:xfrm>
+            <a:off x="1820409" y="1541869"/>
+            <a:ext cx="6861846" cy="295013"/>
+          </a:xfrm>
+          <a:prstGeom prst="roundRect">
+            <a:avLst/>
+          </a:prstGeom>
+          <a:noFill/>
+          <a:ln w="57150">
+            <a:solidFill>
+              <a:schemeClr val="accent6"/>
+            </a:solidFill>
+          </a:ln>
+        </p:spPr>
+        <p:style>
+          <a:lnRef idx="2">
+            <a:schemeClr val="accent1">
+              <a:shade val="50000"/>
+            </a:schemeClr>
+          </a:lnRef>
+          <a:fillRef idx="1">
+            <a:schemeClr val="accent1"/>
+          </a:fillRef>
+          <a:effectRef idx="0">
+            <a:schemeClr val="accent1"/>
+          </a:effectRef>
+          <a:fontRef idx="minor">
+            <a:schemeClr val="lt1"/>
+          </a:fontRef>
+        </p:style>
+        <p:txBody>
+          <a:bodyPr rtlCol="0" anchor="ctr"/>
+          <a:lstStyle/>
+          <a:p>
+            <a:pPr algn="ctr"/>
+            <a:endParaRPr lang="en-SG"/>
+          </a:p>
+        </p:txBody>
+      </p:sp>
+      <p:sp>
+        <p:nvSpPr>
+          <p:cNvPr id="5" name="Rectangle: Rounded Corners 4">
+            <a:extLst>
+              <a:ext uri="{FF2B5EF4-FFF2-40B4-BE49-F238E27FC236}">
+                <a16:creationId xmlns:a16="http://schemas.microsoft.com/office/drawing/2014/main" id="{76E186EA-7F14-4CE3-9281-8B30DAACD43C}"/>
+              </a:ext>
+            </a:extLst>
+          </p:cNvPr>
+          <p:cNvSpPr/>
+          <p:nvPr/>
+        </p:nvSpPr>
+        <p:spPr>
+          <a:xfrm>
+            <a:off x="1820409" y="3657293"/>
+            <a:ext cx="6861846" cy="295013"/>
+          </a:xfrm>
+          <a:prstGeom prst="roundRect">
+            <a:avLst/>
+          </a:prstGeom>
+          <a:noFill/>
+          <a:ln w="57150">
+            <a:solidFill>
+              <a:schemeClr val="accent6"/>
+            </a:solidFill>
+          </a:ln>
+        </p:spPr>
+        <p:style>
+          <a:lnRef idx="2">
+            <a:schemeClr val="accent1">
+              <a:shade val="50000"/>
+            </a:schemeClr>
+          </a:lnRef>
+          <a:fillRef idx="1">
+            <a:schemeClr val="accent1"/>
+          </a:fillRef>
+          <a:effectRef idx="0">
+            <a:schemeClr val="accent1"/>
+          </a:effectRef>
+          <a:fontRef idx="minor">
+            <a:schemeClr val="lt1"/>
+          </a:fontRef>
+        </p:style>
+        <p:txBody>
+          <a:bodyPr rtlCol="0" anchor="ctr"/>
+          <a:lstStyle/>
+          <a:p>
+            <a:pPr algn="ctr"/>
+            <a:endParaRPr lang="en-SG"/>
+          </a:p>
+        </p:txBody>
+      </p:sp>
+      <p:sp>
+        <p:nvSpPr>
+          <p:cNvPr id="6" name="Title 5">
+            <a:extLst>
+              <a:ext uri="{FF2B5EF4-FFF2-40B4-BE49-F238E27FC236}">
+                <a16:creationId xmlns:a16="http://schemas.microsoft.com/office/drawing/2014/main" id="{7FC3F801-6659-4163-8AE3-DD7A4F154F8F}"/>
+              </a:ext>
+            </a:extLst>
+          </p:cNvPr>
+          <p:cNvSpPr>
+            <a:spLocks noGrp="1"/>
+          </p:cNvSpPr>
+          <p:nvPr>
+            <p:ph type="title"/>
+          </p:nvPr>
+        </p:nvSpPr>
+        <p:spPr/>
+        <p:txBody>
+          <a:bodyPr/>
+          <a:lstStyle/>
+          <a:p>
+            <a:r>
+              <a:rPr lang="en-SG" dirty="0"/>
+              <a:t>Before tuning</a:t>
+            </a:r>
+          </a:p>
+        </p:txBody>
+      </p:sp>
+    </p:spTree>
+    <p:extLst>
+      <p:ext uri="{BB962C8B-B14F-4D97-AF65-F5344CB8AC3E}">
+        <p14:creationId xmlns:p14="http://schemas.microsoft.com/office/powerpoint/2010/main" val="681491799"/>
+      </p:ext>
+    </p:extLst>
+  </p:cSld>
+  <p:clrMapOvr>
+    <a:masterClrMapping/>
+  </p:clrMapOvr>
+</p:sld>
+</file>
+
+<file path=ppt/slides/slide4.xml><?xml version="1.0" encoding="utf-8"?>
+<p:sld xmlns:a="http://schemas.openxmlformats.org/drawingml/2006/main" xmlns:r="http://schemas.openxmlformats.org/officeDocument/2006/relationships" xmlns:p="http://schemas.openxmlformats.org/presentationml/2006/main">
+  <p:cSld>
+    <p:spTree>
+      <p:nvGrpSpPr>
+        <p:cNvPr id="1" name=""/>
+        <p:cNvGrpSpPr/>
+        <p:nvPr/>
+      </p:nvGrpSpPr>
+      <p:grpSpPr>
+        <a:xfrm>
+          <a:off x="0" y="0"/>
+          <a:ext cx="0" cy="0"/>
+          <a:chOff x="0" y="0"/>
+          <a:chExt cx="0" cy="0"/>
+        </a:xfrm>
+      </p:grpSpPr>
+      <p:pic>
+        <p:nvPicPr>
+          <p:cNvPr id="6" name="Picture 5">
+            <a:extLst>
+              <a:ext uri="{FF2B5EF4-FFF2-40B4-BE49-F238E27FC236}">
+                <a16:creationId xmlns:a16="http://schemas.microsoft.com/office/drawing/2014/main" id="{10FDDEB1-FE49-4808-A722-CFE1D0E8BC9E}"/>
+              </a:ext>
+            </a:extLst>
+          </p:cNvPr>
+          <p:cNvPicPr>
+            <a:picLocks noChangeAspect="1"/>
+          </p:cNvPicPr>
+          <p:nvPr/>
+        </p:nvPicPr>
+        <p:blipFill>
+          <a:blip r:embed="rId2"/>
+          <a:stretch>
+            <a:fillRect/>
+          </a:stretch>
+        </p:blipFill>
+        <p:spPr>
+          <a:xfrm>
+            <a:off x="2747962" y="1751027"/>
+            <a:ext cx="6696075" cy="3238500"/>
+          </a:xfrm>
+          <a:prstGeom prst="rect">
+            <a:avLst/>
+          </a:prstGeom>
+        </p:spPr>
+      </p:pic>
+      <p:sp>
+        <p:nvSpPr>
+          <p:cNvPr id="3" name="Rectangle: Rounded Corners 2">
+            <a:extLst>
+              <a:ext uri="{FF2B5EF4-FFF2-40B4-BE49-F238E27FC236}">
+                <a16:creationId xmlns:a16="http://schemas.microsoft.com/office/drawing/2014/main" id="{AEC1D823-6F20-49F5-9B65-8427A36C1AAD}"/>
+              </a:ext>
+            </a:extLst>
+          </p:cNvPr>
+          <p:cNvSpPr/>
+          <p:nvPr/>
+        </p:nvSpPr>
+        <p:spPr>
+          <a:xfrm>
+            <a:off x="2665077" y="2952225"/>
+            <a:ext cx="6861846" cy="295013"/>
+          </a:xfrm>
+          <a:prstGeom prst="roundRect">
+            <a:avLst/>
+          </a:prstGeom>
+          <a:noFill/>
+          <a:ln w="57150">
+            <a:solidFill>
+              <a:schemeClr val="accent6"/>
+            </a:solidFill>
+          </a:ln>
+        </p:spPr>
+        <p:style>
+          <a:lnRef idx="2">
+            <a:schemeClr val="accent1">
+              <a:shade val="50000"/>
+            </a:schemeClr>
+          </a:lnRef>
+          <a:fillRef idx="1">
+            <a:schemeClr val="accent1"/>
+          </a:fillRef>
+          <a:effectRef idx="0">
+            <a:schemeClr val="accent1"/>
+          </a:effectRef>
+          <a:fontRef idx="minor">
+            <a:schemeClr val="lt1"/>
+          </a:fontRef>
+        </p:style>
+        <p:txBody>
+          <a:bodyPr rtlCol="0" anchor="ctr"/>
+          <a:lstStyle/>
+          <a:p>
+            <a:pPr algn="ctr"/>
+            <a:endParaRPr lang="en-SG"/>
+          </a:p>
+        </p:txBody>
+      </p:sp>
+      <p:sp>
+        <p:nvSpPr>
+          <p:cNvPr id="4" name="Rectangle: Rounded Corners 3">
+            <a:extLst>
+              <a:ext uri="{FF2B5EF4-FFF2-40B4-BE49-F238E27FC236}">
+                <a16:creationId xmlns:a16="http://schemas.microsoft.com/office/drawing/2014/main" id="{8F57BF1E-665A-463B-9748-1ED869F92296}"/>
+              </a:ext>
+            </a:extLst>
+          </p:cNvPr>
+          <p:cNvSpPr/>
+          <p:nvPr/>
+        </p:nvSpPr>
+        <p:spPr>
+          <a:xfrm>
+            <a:off x="2665077" y="2028431"/>
+            <a:ext cx="6861846" cy="295013"/>
+          </a:xfrm>
+          <a:prstGeom prst="roundRect">
+            <a:avLst/>
+          </a:prstGeom>
+          <a:noFill/>
+          <a:ln w="57150">
+            <a:solidFill>
+              <a:schemeClr val="accent6"/>
+            </a:solidFill>
+          </a:ln>
+        </p:spPr>
+        <p:style>
+          <a:lnRef idx="2">
+            <a:schemeClr val="accent1">
+              <a:shade val="50000"/>
+            </a:schemeClr>
+          </a:lnRef>
+          <a:fillRef idx="1">
+            <a:schemeClr val="accent1"/>
+          </a:fillRef>
+          <a:effectRef idx="0">
+            <a:schemeClr val="accent1"/>
+          </a:effectRef>
+          <a:fontRef idx="minor">
+            <a:schemeClr val="lt1"/>
+          </a:fontRef>
+        </p:style>
+        <p:txBody>
+          <a:bodyPr rtlCol="0" anchor="ctr"/>
+          <a:lstStyle/>
+          <a:p>
+            <a:pPr algn="ctr"/>
+            <a:endParaRPr lang="en-SG"/>
+          </a:p>
+        </p:txBody>
+      </p:sp>
+      <p:sp>
+        <p:nvSpPr>
+          <p:cNvPr id="5" name="Rectangle: Rounded Corners 4">
+            <a:extLst>
+              <a:ext uri="{FF2B5EF4-FFF2-40B4-BE49-F238E27FC236}">
+                <a16:creationId xmlns:a16="http://schemas.microsoft.com/office/drawing/2014/main" id="{9B803048-6C6C-452A-8CDA-FD5E76DFDB44}"/>
+              </a:ext>
+            </a:extLst>
+          </p:cNvPr>
+          <p:cNvSpPr/>
+          <p:nvPr/>
+        </p:nvSpPr>
+        <p:spPr>
+          <a:xfrm>
+            <a:off x="2665077" y="4143855"/>
+            <a:ext cx="6861846" cy="295013"/>
+          </a:xfrm>
+          <a:prstGeom prst="roundRect">
+            <a:avLst/>
+          </a:prstGeom>
+          <a:noFill/>
+          <a:ln w="57150">
+            <a:solidFill>
+              <a:schemeClr val="accent6"/>
+            </a:solidFill>
+          </a:ln>
+        </p:spPr>
+        <p:style>
+          <a:lnRef idx="2">
+            <a:schemeClr val="accent1">
+              <a:shade val="50000"/>
+            </a:schemeClr>
+          </a:lnRef>
+          <a:fillRef idx="1">
+            <a:schemeClr val="accent1"/>
+          </a:fillRef>
+          <a:effectRef idx="0">
+            <a:schemeClr val="accent1"/>
+          </a:effectRef>
+          <a:fontRef idx="minor">
+            <a:schemeClr val="lt1"/>
+          </a:fontRef>
+        </p:style>
+        <p:txBody>
+          <a:bodyPr rtlCol="0" anchor="ctr"/>
+          <a:lstStyle/>
+          <a:p>
+            <a:pPr algn="ctr"/>
+            <a:endParaRPr lang="en-SG"/>
+          </a:p>
+        </p:txBody>
+      </p:sp>
+      <p:sp>
+        <p:nvSpPr>
+          <p:cNvPr id="7" name="Title 6">
+            <a:extLst>
+              <a:ext uri="{FF2B5EF4-FFF2-40B4-BE49-F238E27FC236}">
+                <a16:creationId xmlns:a16="http://schemas.microsoft.com/office/drawing/2014/main" id="{43808317-9A4E-49A8-B5D1-5EB7891F6BE0}"/>
+              </a:ext>
+            </a:extLst>
+          </p:cNvPr>
+          <p:cNvSpPr>
+            <a:spLocks noGrp="1"/>
+          </p:cNvSpPr>
+          <p:nvPr>
+            <p:ph type="title"/>
+          </p:nvPr>
+        </p:nvSpPr>
+        <p:spPr/>
+        <p:txBody>
+          <a:bodyPr/>
+          <a:lstStyle/>
+          <a:p>
+            <a:r>
+              <a:rPr lang="en-SG" dirty="0"/>
+              <a:t>After hyper parameter tuning</a:t>
+            </a:r>
+          </a:p>
+        </p:txBody>
+      </p:sp>
+    </p:spTree>
+    <p:extLst>
+      <p:ext uri="{BB962C8B-B14F-4D97-AF65-F5344CB8AC3E}">
+        <p14:creationId xmlns:p14="http://schemas.microsoft.com/office/powerpoint/2010/main" val="2137400856"/>
+      </p:ext>
+    </p:extLst>
+  </p:cSld>
+  <p:clrMapOvr>
+    <a:masterClrMapping/>
+  </p:clrMapOvr>
+</p:sld>
+</file>
+
+<file path=ppt/slides/slide5.xml><?xml version="1.0" encoding="utf-8"?>
+<p:sld xmlns:a="http://schemas.openxmlformats.org/drawingml/2006/main" xmlns:r="http://schemas.openxmlformats.org/officeDocument/2006/relationships" xmlns:p="http://schemas.openxmlformats.org/presentationml/2006/main">
+  <p:cSld>
+    <p:spTree>
+      <p:nvGrpSpPr>
+        <p:cNvPr id="1" name=""/>
+        <p:cNvGrpSpPr/>
+        <p:nvPr/>
+      </p:nvGrpSpPr>
+      <p:grpSpPr>
+        <a:xfrm>
+          <a:off x="0" y="0"/>
+          <a:ext cx="0" cy="0"/>
+          <a:chOff x="0" y="0"/>
+          <a:chExt cx="0" cy="0"/>
+        </a:xfrm>
+      </p:grpSpPr>
+      <p:sp>
+        <p:nvSpPr>
+          <p:cNvPr id="2" name="Title 1">
+            <a:extLst>
+              <a:ext uri="{FF2B5EF4-FFF2-40B4-BE49-F238E27FC236}">
+                <a16:creationId xmlns:a16="http://schemas.microsoft.com/office/drawing/2014/main" id="{F66ADD7B-191B-4A23-B760-B580BDD9C104}"/>
+              </a:ext>
+            </a:extLst>
+          </p:cNvPr>
+          <p:cNvSpPr>
+            <a:spLocks noGrp="1"/>
+          </p:cNvSpPr>
+          <p:nvPr>
+            <p:ph type="title"/>
+          </p:nvPr>
+        </p:nvSpPr>
+        <p:spPr/>
+        <p:txBody>
+          <a:bodyPr/>
+          <a:lstStyle/>
+          <a:p>
+            <a:endParaRPr lang="en-SG"/>
+          </a:p>
+        </p:txBody>
+      </p:sp>
+      <p:pic>
+        <p:nvPicPr>
+          <p:cNvPr id="1026" name="Picture 2">
+            <a:extLst>
+              <a:ext uri="{FF2B5EF4-FFF2-40B4-BE49-F238E27FC236}">
+                <a16:creationId xmlns:a16="http://schemas.microsoft.com/office/drawing/2014/main" id="{2AC015E5-AB4C-4096-B609-6390FE574430}"/>
+              </a:ext>
+            </a:extLst>
+          </p:cNvPr>
+          <p:cNvPicPr>
+            <a:picLocks noChangeAspect="1" noChangeArrowheads="1"/>
+          </p:cNvPicPr>
+          <p:nvPr/>
+        </p:nvPicPr>
+        <p:blipFill>
+          <a:blip r:embed="rId2">
+            <a:extLst>
+              <a:ext uri="{28A0092B-C50C-407E-A947-70E740481C1C}">
+                <a14:useLocalDpi xmlns:a14="http://schemas.microsoft.com/office/drawing/2010/main" val="0"/>
+              </a:ext>
+            </a:extLst>
+          </a:blip>
+          <a:srcRect/>
+          <a:stretch>
+            <a:fillRect/>
+          </a:stretch>
+        </p:blipFill>
+        <p:spPr bwMode="auto">
+          <a:xfrm>
+            <a:off x="1905000" y="0"/>
+            <a:ext cx="8382000" cy="6858000"/>
+          </a:xfrm>
+          <a:prstGeom prst="rect">
+            <a:avLst/>
+          </a:prstGeom>
+          <a:noFill/>
+          <a:extLst>
+            <a:ext uri="{909E8E84-426E-40DD-AFC4-6F175D3DCCD1}">
+              <a14:hiddenFill xmlns:a14="http://schemas.microsoft.com/office/drawing/2010/main">
+                <a:solidFill>
+                  <a:srgbClr val="FFFFFF"/>
+                </a:solidFill>
+              </a14:hiddenFill>
+            </a:ext>
+          </a:extLst>
+        </p:spPr>
+      </p:pic>
+    </p:spTree>
+    <p:extLst>
+      <p:ext uri="{BB962C8B-B14F-4D97-AF65-F5344CB8AC3E}">
+        <p14:creationId xmlns:p14="http://schemas.microsoft.com/office/powerpoint/2010/main" val="3263185807"/>
+      </p:ext>
+    </p:extLst>
+  </p:cSld>
+  <p:clrMapOvr>
+    <a:masterClrMapping/>
+  </p:clrMapOvr>
+</p:sld>
+</file>
+
+<file path=ppt/slides/slide6.xml><?xml version="1.0" encoding="utf-8"?>
+<p:sld xmlns:a="http://schemas.openxmlformats.org/drawingml/2006/main" xmlns:r="http://schemas.openxmlformats.org/officeDocument/2006/relationships" xmlns:p="http://schemas.openxmlformats.org/presentationml/2006/main">
+  <p:cSld>
+    <p:spTree>
+      <p:nvGrpSpPr>
+        <p:cNvPr id="1" name=""/>
+        <p:cNvGrpSpPr/>
+        <p:nvPr/>
+      </p:nvGrpSpPr>
+      <p:grpSpPr>
+        <a:xfrm>
+          <a:off x="0" y="0"/>
+          <a:ext cx="0" cy="0"/>
+          <a:chOff x="0" y="0"/>
+          <a:chExt cx="0" cy="0"/>
+        </a:xfrm>
+      </p:grpSpPr>
+      <p:pic>
+        <p:nvPicPr>
+          <p:cNvPr id="3" name="Picture 2">
+            <a:extLst>
+              <a:ext uri="{FF2B5EF4-FFF2-40B4-BE49-F238E27FC236}">
+                <a16:creationId xmlns:a16="http://schemas.microsoft.com/office/drawing/2014/main" id="{69745A74-90A7-486B-AB32-E15B316DC9B7}"/>
+              </a:ext>
+            </a:extLst>
+          </p:cNvPr>
+          <p:cNvPicPr>
+            <a:picLocks noChangeAspect="1"/>
+          </p:cNvPicPr>
+          <p:nvPr/>
+        </p:nvPicPr>
+        <p:blipFill>
+          <a:blip r:embed="rId2"/>
+          <a:stretch>
+            <a:fillRect/>
+          </a:stretch>
+        </p:blipFill>
+        <p:spPr>
+          <a:xfrm>
+            <a:off x="3133725" y="552450"/>
+            <a:ext cx="5924550" cy="5753100"/>
+          </a:xfrm>
+          <a:prstGeom prst="rect">
+            <a:avLst/>
+          </a:prstGeom>
+        </p:spPr>
+      </p:pic>
+      <p:sp>
+        <p:nvSpPr>
+          <p:cNvPr id="4" name="Rectangle: Rounded Corners 3">
+            <a:extLst>
+              <a:ext uri="{FF2B5EF4-FFF2-40B4-BE49-F238E27FC236}">
+                <a16:creationId xmlns:a16="http://schemas.microsoft.com/office/drawing/2014/main" id="{20A4456A-450E-4CAD-98C5-C061EAAA617D}"/>
+              </a:ext>
+            </a:extLst>
+          </p:cNvPr>
+          <p:cNvSpPr/>
+          <p:nvPr/>
+        </p:nvSpPr>
+        <p:spPr>
+          <a:xfrm>
+            <a:off x="7977928" y="4546133"/>
+            <a:ext cx="864067" cy="295013"/>
+          </a:xfrm>
+          <a:prstGeom prst="roundRect">
+            <a:avLst/>
+          </a:prstGeom>
+          <a:noFill/>
+          <a:ln w="57150">
+            <a:solidFill>
+              <a:schemeClr val="accent6"/>
+            </a:solidFill>
+          </a:ln>
+        </p:spPr>
+        <p:style>
+          <a:lnRef idx="2">
+            <a:schemeClr val="accent1">
+              <a:shade val="50000"/>
+            </a:schemeClr>
+          </a:lnRef>
+          <a:fillRef idx="1">
+            <a:schemeClr val="accent1"/>
+          </a:fillRef>
+          <a:effectRef idx="0">
+            <a:schemeClr val="accent1"/>
+          </a:effectRef>
+          <a:fontRef idx="minor">
+            <a:schemeClr val="lt1"/>
+          </a:fontRef>
+        </p:style>
+        <p:txBody>
+          <a:bodyPr rtlCol="0" anchor="ctr"/>
+          <a:lstStyle/>
+          <a:p>
+            <a:pPr algn="ctr"/>
+            <a:endParaRPr lang="en-SG"/>
+          </a:p>
+        </p:txBody>
+      </p:sp>
+    </p:spTree>
+    <p:extLst>
+      <p:ext uri="{BB962C8B-B14F-4D97-AF65-F5344CB8AC3E}">
+        <p14:creationId xmlns:p14="http://schemas.microsoft.com/office/powerpoint/2010/main" val="116315548"/>
+      </p:ext>
+    </p:extLst>
+  </p:cSld>
+  <p:clrMapOvr>
+    <a:masterClrMapping/>
+  </p:clrMapOvr>
+</p:sld>
+</file>
+
+<file path=ppt/slides/slide7.xml><?xml version="1.0" encoding="utf-8"?>
+<p:sld xmlns:a="http://schemas.openxmlformats.org/drawingml/2006/main" xmlns:r="http://schemas.openxmlformats.org/officeDocument/2006/relationships" xmlns:p="http://schemas.openxmlformats.org/presentationml/2006/main">
+  <p:cSld>
+    <p:spTree>
+      <p:nvGrpSpPr>
+        <p:cNvPr id="1" name=""/>
+        <p:cNvGrpSpPr/>
+        <p:nvPr/>
+      </p:nvGrpSpPr>
+      <p:grpSpPr>
+        <a:xfrm>
+          <a:off x="0" y="0"/>
+          <a:ext cx="0" cy="0"/>
+          <a:chOff x="0" y="0"/>
+          <a:chExt cx="0" cy="0"/>
+        </a:xfrm>
+      </p:grpSpPr>
+      <p:pic>
+        <p:nvPicPr>
+          <p:cNvPr id="2" name="Picture 1">
+            <a:extLst>
+              <a:ext uri="{FF2B5EF4-FFF2-40B4-BE49-F238E27FC236}">
+                <a16:creationId xmlns:a16="http://schemas.microsoft.com/office/drawing/2014/main" id="{12F8E62B-FDD7-4D04-8660-D8ABFC563448}"/>
+              </a:ext>
+            </a:extLst>
+          </p:cNvPr>
+          <p:cNvPicPr>
+            <a:picLocks noChangeAspect="1"/>
+          </p:cNvPicPr>
+          <p:nvPr/>
+        </p:nvPicPr>
+        <p:blipFill>
+          <a:blip r:embed="rId2"/>
+          <a:stretch>
+            <a:fillRect/>
+          </a:stretch>
+        </p:blipFill>
+        <p:spPr>
+          <a:xfrm>
+            <a:off x="1423987" y="2157412"/>
+            <a:ext cx="9344025" cy="2543175"/>
+          </a:xfrm>
+          <a:prstGeom prst="rect">
+            <a:avLst/>
+          </a:prstGeom>
+        </p:spPr>
+      </p:pic>
+    </p:spTree>
+    <p:extLst>
+      <p:ext uri="{BB962C8B-B14F-4D97-AF65-F5344CB8AC3E}">
+        <p14:creationId xmlns:p14="http://schemas.microsoft.com/office/powerpoint/2010/main" val="3639699112"/>
+      </p:ext>
+    </p:extLst>
+  </p:cSld>
+  <p:clrMapOvr>
+    <a:masterClrMapping/>
+  </p:clrMapOvr>
+</p:sld>
+</file>
+
+<file path=ppt/slides/slide8.xml><?xml version="1.0" encoding="utf-8"?>
+<p:sld xmlns:a="http://schemas.openxmlformats.org/drawingml/2006/main" xmlns:r="http://schemas.openxmlformats.org/officeDocument/2006/relationships" xmlns:p="http://schemas.openxmlformats.org/presentationml/2006/main">
+  <p:cSld>
+    <p:spTree>
+      <p:nvGrpSpPr>
+        <p:cNvPr id="1" name=""/>
+        <p:cNvGrpSpPr/>
+        <p:nvPr/>
+      </p:nvGrpSpPr>
+      <p:grpSpPr>
+        <a:xfrm>
+          <a:off x="0" y="0"/>
+          <a:ext cx="0" cy="0"/>
+          <a:chOff x="0" y="0"/>
+          <a:chExt cx="0" cy="0"/>
+        </a:xfrm>
+      </p:grpSpPr>
+      <p:sp>
+        <p:nvSpPr>
+          <p:cNvPr id="2" name="Title 1">
+            <a:extLst>
+              <a:ext uri="{FF2B5EF4-FFF2-40B4-BE49-F238E27FC236}">
+                <a16:creationId xmlns:a16="http://schemas.microsoft.com/office/drawing/2014/main" id="{E2DD15EA-4799-41FB-A4F0-CCBE5FE39C69}"/>
+              </a:ext>
+            </a:extLst>
+          </p:cNvPr>
+          <p:cNvSpPr>
+            <a:spLocks noGrp="1"/>
+          </p:cNvSpPr>
+          <p:nvPr>
+            <p:ph type="title"/>
+          </p:nvPr>
+        </p:nvSpPr>
+        <p:spPr/>
+        <p:txBody>
+          <a:bodyPr/>
+          <a:lstStyle/>
+          <a:p>
+            <a:endParaRPr lang="en-SG"/>
+          </a:p>
+        </p:txBody>
+      </p:sp>
+    </p:spTree>
+    <p:extLst>
+      <p:ext uri="{BB962C8B-B14F-4D97-AF65-F5344CB8AC3E}">
+        <p14:creationId xmlns:p14="http://schemas.microsoft.com/office/powerpoint/2010/main" val="864917703"/>
+      </p:ext>
+    </p:extLst>
+  </p:cSld>
+  <p:clrMapOvr>
+    <a:masterClrMapping/>
+  </p:clrMapOvr>
+</p:sld>
+</file>
+
 <file path=ppt/theme/theme1.xml><?xml version="1.0" encoding="utf-8"?>
 <a:theme xmlns:a="http://schemas.openxmlformats.org/drawingml/2006/main" name="Office Theme">
   <a:themeElements>

</xml_diff>